<commit_message>
Feat : Diary Detail (title, picture) v2
</commit_message>
<xml_diff>
--- a/김관섭/source code/2023-01-18_일지 상세페이지/[DEV]작물 일지(피드) - 일지 상세페이지.pptx
+++ b/김관섭/source code/2023-01-18_일지 상세페이지/[DEV]작물 일지(피드) - 일지 상세페이지.pptx
@@ -105,6 +105,11 @@
       </a:defRPr>
     </a:lvl9pPr>
   </p:defaultTextStyle>
+  <p:extLst>
+    <p:ext uri="{EFAFB233-063F-42B5-8137-9DF3F51BA10A}">
+      <p15:sldGuideLst xmlns:p15="http://schemas.microsoft.com/office/powerpoint/2012/main"/>
+    </p:ext>
+  </p:extLst>
 </p:presentation>
 </file>
 
@@ -239,7 +244,7 @@
           <a:p>
             <a:fld id="{72F260E4-A045-49A7-A162-832FE4826458}" type="datetimeFigureOut">
               <a:rPr lang="ko-KR" altLang="en-US" smtClean="0"/>
-              <a:t>2023-01-18</a:t>
+              <a:t>2023-01-19</a:t>
             </a:fld>
             <a:endParaRPr lang="ko-KR" altLang="en-US"/>
           </a:p>
@@ -409,7 +414,7 @@
           <a:p>
             <a:fld id="{72F260E4-A045-49A7-A162-832FE4826458}" type="datetimeFigureOut">
               <a:rPr lang="ko-KR" altLang="en-US" smtClean="0"/>
-              <a:t>2023-01-18</a:t>
+              <a:t>2023-01-19</a:t>
             </a:fld>
             <a:endParaRPr lang="ko-KR" altLang="en-US"/>
           </a:p>
@@ -589,7 +594,7 @@
           <a:p>
             <a:fld id="{72F260E4-A045-49A7-A162-832FE4826458}" type="datetimeFigureOut">
               <a:rPr lang="ko-KR" altLang="en-US" smtClean="0"/>
-              <a:t>2023-01-18</a:t>
+              <a:t>2023-01-19</a:t>
             </a:fld>
             <a:endParaRPr lang="ko-KR" altLang="en-US"/>
           </a:p>
@@ -759,7 +764,7 @@
           <a:p>
             <a:fld id="{72F260E4-A045-49A7-A162-832FE4826458}" type="datetimeFigureOut">
               <a:rPr lang="ko-KR" altLang="en-US" smtClean="0"/>
-              <a:t>2023-01-18</a:t>
+              <a:t>2023-01-19</a:t>
             </a:fld>
             <a:endParaRPr lang="ko-KR" altLang="en-US"/>
           </a:p>
@@ -1005,7 +1010,7 @@
           <a:p>
             <a:fld id="{72F260E4-A045-49A7-A162-832FE4826458}" type="datetimeFigureOut">
               <a:rPr lang="ko-KR" altLang="en-US" smtClean="0"/>
-              <a:t>2023-01-18</a:t>
+              <a:t>2023-01-19</a:t>
             </a:fld>
             <a:endParaRPr lang="ko-KR" altLang="en-US"/>
           </a:p>
@@ -1237,7 +1242,7 @@
           <a:p>
             <a:fld id="{72F260E4-A045-49A7-A162-832FE4826458}" type="datetimeFigureOut">
               <a:rPr lang="ko-KR" altLang="en-US" smtClean="0"/>
-              <a:t>2023-01-18</a:t>
+              <a:t>2023-01-19</a:t>
             </a:fld>
             <a:endParaRPr lang="ko-KR" altLang="en-US"/>
           </a:p>
@@ -1604,7 +1609,7 @@
           <a:p>
             <a:fld id="{72F260E4-A045-49A7-A162-832FE4826458}" type="datetimeFigureOut">
               <a:rPr lang="ko-KR" altLang="en-US" smtClean="0"/>
-              <a:t>2023-01-18</a:t>
+              <a:t>2023-01-19</a:t>
             </a:fld>
             <a:endParaRPr lang="ko-KR" altLang="en-US"/>
           </a:p>
@@ -1722,7 +1727,7 @@
           <a:p>
             <a:fld id="{72F260E4-A045-49A7-A162-832FE4826458}" type="datetimeFigureOut">
               <a:rPr lang="ko-KR" altLang="en-US" smtClean="0"/>
-              <a:t>2023-01-18</a:t>
+              <a:t>2023-01-19</a:t>
             </a:fld>
             <a:endParaRPr lang="ko-KR" altLang="en-US"/>
           </a:p>
@@ -1817,7 +1822,7 @@
           <a:p>
             <a:fld id="{72F260E4-A045-49A7-A162-832FE4826458}" type="datetimeFigureOut">
               <a:rPr lang="ko-KR" altLang="en-US" smtClean="0"/>
-              <a:t>2023-01-18</a:t>
+              <a:t>2023-01-19</a:t>
             </a:fld>
             <a:endParaRPr lang="ko-KR" altLang="en-US"/>
           </a:p>
@@ -2094,7 +2099,7 @@
           <a:p>
             <a:fld id="{72F260E4-A045-49A7-A162-832FE4826458}" type="datetimeFigureOut">
               <a:rPr lang="ko-KR" altLang="en-US" smtClean="0"/>
-              <a:t>2023-01-18</a:t>
+              <a:t>2023-01-19</a:t>
             </a:fld>
             <a:endParaRPr lang="ko-KR" altLang="en-US"/>
           </a:p>
@@ -2347,7 +2352,7 @@
           <a:p>
             <a:fld id="{72F260E4-A045-49A7-A162-832FE4826458}" type="datetimeFigureOut">
               <a:rPr lang="ko-KR" altLang="en-US" smtClean="0"/>
-              <a:t>2023-01-18</a:t>
+              <a:t>2023-01-19</a:t>
             </a:fld>
             <a:endParaRPr lang="ko-KR" altLang="en-US"/>
           </a:p>
@@ -2560,7 +2565,7 @@
           <a:p>
             <a:fld id="{72F260E4-A045-49A7-A162-832FE4826458}" type="datetimeFigureOut">
               <a:rPr lang="ko-KR" altLang="en-US" smtClean="0"/>
-              <a:t>2023-01-18</a:t>
+              <a:t>2023-01-19</a:t>
             </a:fld>
             <a:endParaRPr lang="ko-KR" altLang="en-US"/>
           </a:p>
@@ -3756,6 +3761,409 @@
           </a:p>
         </p:txBody>
       </p:sp>
+      <p:pic>
+        <p:nvPicPr>
+          <p:cNvPr id="2" name="그림 1"/>
+          <p:cNvPicPr>
+            <a:picLocks noChangeAspect="1"/>
+          </p:cNvPicPr>
+          <p:nvPr/>
+        </p:nvPicPr>
+        <p:blipFill>
+          <a:blip r:embed="rId4"/>
+          <a:stretch>
+            <a:fillRect/>
+          </a:stretch>
+        </p:blipFill>
+        <p:spPr>
+          <a:xfrm>
+            <a:off x="4911087" y="3709839"/>
+            <a:ext cx="4685149" cy="544010"/>
+          </a:xfrm>
+          <a:prstGeom prst="rect">
+            <a:avLst/>
+          </a:prstGeom>
+        </p:spPr>
+      </p:pic>
+      <p:pic>
+        <p:nvPicPr>
+          <p:cNvPr id="3" name="그림 2"/>
+          <p:cNvPicPr>
+            <a:picLocks noChangeAspect="1"/>
+          </p:cNvPicPr>
+          <p:nvPr/>
+        </p:nvPicPr>
+        <p:blipFill>
+          <a:blip r:embed="rId5">
+            <a:extLst>
+              <a:ext uri="{28A0092B-C50C-407E-A947-70E740481C1C}">
+                <a14:useLocalDpi xmlns:a14="http://schemas.microsoft.com/office/drawing/2010/main" val="0"/>
+              </a:ext>
+            </a:extLst>
+          </a:blip>
+          <a:stretch>
+            <a:fillRect/>
+          </a:stretch>
+        </p:blipFill>
+        <p:spPr>
+          <a:xfrm>
+            <a:off x="1438776" y="4523356"/>
+            <a:ext cx="288424" cy="288424"/>
+          </a:xfrm>
+          <a:prstGeom prst="rect">
+            <a:avLst/>
+          </a:prstGeom>
+        </p:spPr>
+      </p:pic>
+      <p:sp>
+        <p:nvSpPr>
+          <p:cNvPr id="4" name="직사각형 3"/>
+          <p:cNvSpPr/>
+          <p:nvPr/>
+        </p:nvSpPr>
+        <p:spPr>
+          <a:xfrm>
+            <a:off x="5681736" y="3862791"/>
+            <a:ext cx="376164" cy="329202"/>
+          </a:xfrm>
+          <a:prstGeom prst="rect">
+            <a:avLst/>
+          </a:prstGeom>
+          <a:solidFill>
+            <a:schemeClr val="bg1"/>
+          </a:solidFill>
+          <a:ln>
+            <a:noFill/>
+          </a:ln>
+        </p:spPr>
+        <p:style>
+          <a:lnRef idx="2">
+            <a:schemeClr val="accent1">
+              <a:shade val="50000"/>
+            </a:schemeClr>
+          </a:lnRef>
+          <a:fillRef idx="1">
+            <a:schemeClr val="accent1"/>
+          </a:fillRef>
+          <a:effectRef idx="0">
+            <a:schemeClr val="accent1"/>
+          </a:effectRef>
+          <a:fontRef idx="minor">
+            <a:schemeClr val="lt1"/>
+          </a:fontRef>
+        </p:style>
+        <p:txBody>
+          <a:bodyPr rtlCol="0" anchor="ctr"/>
+          <a:lstStyle/>
+          <a:p>
+            <a:pPr algn="ctr"/>
+            <a:endParaRPr lang="ko-KR" altLang="en-US"/>
+          </a:p>
+        </p:txBody>
+      </p:sp>
+      <p:sp>
+        <p:nvSpPr>
+          <p:cNvPr id="23" name="직사각형 22"/>
+          <p:cNvSpPr/>
+          <p:nvPr/>
+        </p:nvSpPr>
+        <p:spPr>
+          <a:xfrm>
+            <a:off x="5267960" y="3834667"/>
+            <a:ext cx="469392" cy="358975"/>
+          </a:xfrm>
+          <a:prstGeom prst="rect">
+            <a:avLst/>
+          </a:prstGeom>
+          <a:noFill/>
+          <a:ln w="34925">
+            <a:solidFill>
+              <a:srgbClr val="FF0000"/>
+            </a:solidFill>
+          </a:ln>
+        </p:spPr>
+        <p:style>
+          <a:lnRef idx="2">
+            <a:schemeClr val="accent1">
+              <a:shade val="50000"/>
+            </a:schemeClr>
+          </a:lnRef>
+          <a:fillRef idx="1">
+            <a:schemeClr val="accent1"/>
+          </a:fillRef>
+          <a:effectRef idx="0">
+            <a:schemeClr val="accent1"/>
+          </a:effectRef>
+          <a:fontRef idx="minor">
+            <a:schemeClr val="lt1"/>
+          </a:fontRef>
+        </p:style>
+        <p:txBody>
+          <a:bodyPr rtlCol="0" anchor="ctr"/>
+          <a:lstStyle/>
+          <a:p>
+            <a:pPr algn="ctr"/>
+            <a:endParaRPr lang="ko-KR" altLang="en-US"/>
+          </a:p>
+        </p:txBody>
+      </p:sp>
+      <p:pic>
+        <p:nvPicPr>
+          <p:cNvPr id="26" name="그림 25"/>
+          <p:cNvPicPr>
+            <a:picLocks noChangeAspect="1"/>
+          </p:cNvPicPr>
+          <p:nvPr/>
+        </p:nvPicPr>
+        <p:blipFill>
+          <a:blip r:embed="rId5">
+            <a:extLst>
+              <a:ext uri="{28A0092B-C50C-407E-A947-70E740481C1C}">
+                <a14:useLocalDpi xmlns:a14="http://schemas.microsoft.com/office/drawing/2010/main" val="0"/>
+              </a:ext>
+            </a:extLst>
+          </a:blip>
+          <a:stretch>
+            <a:fillRect/>
+          </a:stretch>
+        </p:blipFill>
+        <p:spPr>
+          <a:xfrm>
+            <a:off x="5763260" y="3840954"/>
+            <a:ext cx="403065" cy="403065"/>
+          </a:xfrm>
+          <a:prstGeom prst="rect">
+            <a:avLst/>
+          </a:prstGeom>
+        </p:spPr>
+      </p:pic>
+      <p:sp>
+        <p:nvSpPr>
+          <p:cNvPr id="24" name="직사각형 23"/>
+          <p:cNvSpPr/>
+          <p:nvPr/>
+        </p:nvSpPr>
+        <p:spPr>
+          <a:xfrm>
+            <a:off x="5763259" y="3840621"/>
+            <a:ext cx="403065" cy="353022"/>
+          </a:xfrm>
+          <a:prstGeom prst="rect">
+            <a:avLst/>
+          </a:prstGeom>
+          <a:noFill/>
+          <a:ln w="34925">
+            <a:solidFill>
+              <a:srgbClr val="FFC000"/>
+            </a:solidFill>
+          </a:ln>
+        </p:spPr>
+        <p:style>
+          <a:lnRef idx="2">
+            <a:schemeClr val="accent1">
+              <a:shade val="50000"/>
+            </a:schemeClr>
+          </a:lnRef>
+          <a:fillRef idx="1">
+            <a:schemeClr val="accent1"/>
+          </a:fillRef>
+          <a:effectRef idx="0">
+            <a:schemeClr val="accent1"/>
+          </a:effectRef>
+          <a:fontRef idx="minor">
+            <a:schemeClr val="lt1"/>
+          </a:fontRef>
+        </p:style>
+        <p:txBody>
+          <a:bodyPr rtlCol="0" anchor="ctr"/>
+          <a:lstStyle/>
+          <a:p>
+            <a:pPr algn="ctr"/>
+            <a:endParaRPr lang="ko-KR" altLang="en-US"/>
+          </a:p>
+        </p:txBody>
+      </p:sp>
+      <p:sp>
+        <p:nvSpPr>
+          <p:cNvPr id="5" name="직사각형 4"/>
+          <p:cNvSpPr/>
+          <p:nvPr/>
+        </p:nvSpPr>
+        <p:spPr>
+          <a:xfrm>
+            <a:off x="4911087" y="4221160"/>
+            <a:ext cx="4685149" cy="274024"/>
+          </a:xfrm>
+          <a:prstGeom prst="rect">
+            <a:avLst/>
+          </a:prstGeom>
+          <a:solidFill>
+            <a:schemeClr val="bg1"/>
+          </a:solidFill>
+          <a:ln>
+            <a:noFill/>
+          </a:ln>
+        </p:spPr>
+        <p:style>
+          <a:lnRef idx="2">
+            <a:schemeClr val="accent1">
+              <a:shade val="50000"/>
+            </a:schemeClr>
+          </a:lnRef>
+          <a:fillRef idx="1">
+            <a:schemeClr val="accent1"/>
+          </a:fillRef>
+          <a:effectRef idx="0">
+            <a:schemeClr val="accent1"/>
+          </a:effectRef>
+          <a:fontRef idx="minor">
+            <a:schemeClr val="lt1"/>
+          </a:fontRef>
+        </p:style>
+        <p:txBody>
+          <a:bodyPr rtlCol="0" anchor="ctr"/>
+          <a:lstStyle/>
+          <a:p>
+            <a:pPr algn="ctr"/>
+            <a:endParaRPr lang="ko-KR" altLang="en-US" dirty="0"/>
+          </a:p>
+        </p:txBody>
+      </p:sp>
+      <p:sp>
+        <p:nvSpPr>
+          <p:cNvPr id="8" name="TextBox 7"/>
+          <p:cNvSpPr txBox="1"/>
+          <p:nvPr/>
+        </p:nvSpPr>
+        <p:spPr>
+          <a:xfrm>
+            <a:off x="5161366" y="4271536"/>
+            <a:ext cx="803425" cy="323165"/>
+          </a:xfrm>
+          <a:prstGeom prst="rect">
+            <a:avLst/>
+          </a:prstGeom>
+          <a:noFill/>
+        </p:spPr>
+        <p:txBody>
+          <a:bodyPr wrap="none" rtlCol="0">
+            <a:spAutoFit/>
+          </a:bodyPr>
+          <a:lstStyle/>
+          <a:p>
+            <a:r>
+              <a:rPr lang="ko-KR" altLang="en-US" sz="1500" dirty="0" smtClean="0">
+                <a:latin typeface="배달의민족 주아" panose="02020603020101020101" pitchFamily="18" charset="-127"/>
+                <a:ea typeface="배달의민족 주아" panose="02020603020101020101" pitchFamily="18" charset="-127"/>
+              </a:rPr>
+              <a:t>좋아요 </a:t>
+            </a:r>
+            <a:r>
+              <a:rPr lang="en-US" altLang="ko-KR" sz="1500" dirty="0" smtClean="0">
+                <a:latin typeface="배달의민족 주아" panose="02020603020101020101" pitchFamily="18" charset="-127"/>
+                <a:ea typeface="배달의민족 주아" panose="02020603020101020101" pitchFamily="18" charset="-127"/>
+              </a:rPr>
+              <a:t>3</a:t>
+            </a:r>
+            <a:endParaRPr lang="ko-KR" altLang="en-US" sz="1500" dirty="0">
+              <a:latin typeface="배달의민족 주아" panose="02020603020101020101" pitchFamily="18" charset="-127"/>
+              <a:ea typeface="배달의민족 주아" panose="02020603020101020101" pitchFamily="18" charset="-127"/>
+            </a:endParaRPr>
+          </a:p>
+        </p:txBody>
+      </p:sp>
+      <p:sp>
+        <p:nvSpPr>
+          <p:cNvPr id="27" name="직사각형 26"/>
+          <p:cNvSpPr/>
+          <p:nvPr/>
+        </p:nvSpPr>
+        <p:spPr>
+          <a:xfrm>
+            <a:off x="4975860" y="3795939"/>
+            <a:ext cx="4511040" cy="778784"/>
+          </a:xfrm>
+          <a:prstGeom prst="rect">
+            <a:avLst/>
+          </a:prstGeom>
+          <a:noFill/>
+          <a:ln w="50800">
+            <a:solidFill>
+              <a:srgbClr val="0070C0"/>
+            </a:solidFill>
+          </a:ln>
+        </p:spPr>
+        <p:style>
+          <a:lnRef idx="2">
+            <a:schemeClr val="accent1">
+              <a:shade val="50000"/>
+            </a:schemeClr>
+          </a:lnRef>
+          <a:fillRef idx="1">
+            <a:schemeClr val="accent1"/>
+          </a:fillRef>
+          <a:effectRef idx="0">
+            <a:schemeClr val="accent1"/>
+          </a:effectRef>
+          <a:fontRef idx="minor">
+            <a:schemeClr val="lt1"/>
+          </a:fontRef>
+        </p:style>
+        <p:txBody>
+          <a:bodyPr rtlCol="0" anchor="ctr"/>
+          <a:lstStyle/>
+          <a:p>
+            <a:pPr algn="ctr"/>
+            <a:endParaRPr lang="ko-KR" altLang="en-US"/>
+          </a:p>
+        </p:txBody>
+      </p:sp>
+      <p:sp>
+        <p:nvSpPr>
+          <p:cNvPr id="28" name="직사각형 27"/>
+          <p:cNvSpPr/>
+          <p:nvPr/>
+        </p:nvSpPr>
+        <p:spPr>
+          <a:xfrm>
+            <a:off x="5256965" y="4273185"/>
+            <a:ext cx="698937" cy="258985"/>
+          </a:xfrm>
+          <a:prstGeom prst="rect">
+            <a:avLst/>
+          </a:prstGeom>
+          <a:noFill/>
+          <a:ln w="34925">
+            <a:solidFill>
+              <a:schemeClr val="tx1"/>
+            </a:solidFill>
+          </a:ln>
+        </p:spPr>
+        <p:style>
+          <a:lnRef idx="2">
+            <a:schemeClr val="accent1">
+              <a:shade val="50000"/>
+            </a:schemeClr>
+          </a:lnRef>
+          <a:fillRef idx="1">
+            <a:schemeClr val="accent1"/>
+          </a:fillRef>
+          <a:effectRef idx="0">
+            <a:schemeClr val="accent1"/>
+          </a:effectRef>
+          <a:fontRef idx="minor">
+            <a:schemeClr val="lt1"/>
+          </a:fontRef>
+        </p:style>
+        <p:txBody>
+          <a:bodyPr rtlCol="0" anchor="ctr"/>
+          <a:lstStyle/>
+          <a:p>
+            <a:pPr algn="ctr"/>
+            <a:endParaRPr lang="ko-KR" altLang="en-US"/>
+          </a:p>
+        </p:txBody>
+      </p:sp>
     </p:spTree>
     <p:extLst>
       <p:ext uri="{BB962C8B-B14F-4D97-AF65-F5344CB8AC3E}">

</xml_diff>